<commit_message>
updated module 3 gsea lab exercise 4
string and genemania section
</commit_message>
<xml_diff>
--- a/Module2/gsea/images/calculate_score_figure.pptx
+++ b/Module2/gsea/images/calculate_score_figure.pptx
@@ -10,6 +10,8 @@
     <p:sldId id="258" r:id="rId4"/>
     <p:sldId id="259" r:id="rId5"/>
     <p:sldId id="260" r:id="rId6"/>
+    <p:sldId id="261" r:id="rId7"/>
+    <p:sldId id="262" r:id="rId8"/>
   </p:sldIdLst>
   <p:sldSz cx="12192000" cy="6858000"/>
   <p:notesSz cx="6858000" cy="9144000"/>
@@ -10630,6 +10632,1402 @@
 </p:sld>
 </file>
 
+<file path=ppt/slides/slide6.xml><?xml version="1.0" encoding="utf-8"?>
+<p:sld xmlns:a="http://schemas.openxmlformats.org/drawingml/2006/main" xmlns:r="http://schemas.openxmlformats.org/officeDocument/2006/relationships" xmlns:p="http://schemas.openxmlformats.org/presentationml/2006/main">
+  <p:cSld>
+    <p:spTree>
+      <p:nvGrpSpPr>
+        <p:cNvPr id="1" name=""/>
+        <p:cNvGrpSpPr/>
+        <p:nvPr/>
+      </p:nvGrpSpPr>
+      <p:grpSpPr>
+        <a:xfrm>
+          <a:off x="0" y="0"/>
+          <a:ext cx="0" cy="0"/>
+          <a:chOff x="0" y="0"/>
+          <a:chExt cx="0" cy="0"/>
+        </a:xfrm>
+      </p:grpSpPr>
+      <p:sp>
+        <p:nvSpPr>
+          <p:cNvPr id="4" name="TextBox 3">
+            <a:extLst>
+              <a:ext uri="{FF2B5EF4-FFF2-40B4-BE49-F238E27FC236}">
+                <a16:creationId xmlns:a16="http://schemas.microsoft.com/office/drawing/2014/main" id="{880F8E29-23DD-40AC-34A8-688CE0475FAE}"/>
+              </a:ext>
+            </a:extLst>
+          </p:cNvPr>
+          <p:cNvSpPr txBox="1"/>
+          <p:nvPr/>
+        </p:nvSpPr>
+        <p:spPr>
+          <a:xfrm>
+            <a:off x="533505" y="1198150"/>
+            <a:ext cx="1797480" cy="1477328"/>
+          </a:xfrm>
+          <a:prstGeom prst="rect">
+            <a:avLst/>
+          </a:prstGeom>
+          <a:noFill/>
+        </p:spPr>
+        <p:txBody>
+          <a:bodyPr wrap="none" rtlCol="0">
+            <a:spAutoFit/>
+          </a:bodyPr>
+          <a:lstStyle/>
+          <a:p>
+            <a:r>
+              <a:rPr lang="en-US" b="1" dirty="0"/>
+              <a:t>Dataset</a:t>
+            </a:r>
+          </a:p>
+          <a:p>
+            <a:r>
+              <a:rPr lang="en-US" b="1" dirty="0"/>
+              <a:t>Pancreatic </a:t>
+            </a:r>
+          </a:p>
+          <a:p>
+            <a:r>
+              <a:rPr lang="en-US" b="1" dirty="0"/>
+              <a:t>Ductal </a:t>
+            </a:r>
+          </a:p>
+          <a:p>
+            <a:r>
+              <a:rPr lang="en-US" b="1" dirty="0"/>
+              <a:t>Adenocarcinoma</a:t>
+            </a:r>
+          </a:p>
+          <a:p>
+            <a:r>
+              <a:rPr lang="en-US" b="1" dirty="0"/>
+              <a:t>(TCGA)</a:t>
+            </a:r>
+          </a:p>
+        </p:txBody>
+      </p:sp>
+      <p:sp>
+        <p:nvSpPr>
+          <p:cNvPr id="5" name="TextBox 4">
+            <a:extLst>
+              <a:ext uri="{FF2B5EF4-FFF2-40B4-BE49-F238E27FC236}">
+                <a16:creationId xmlns:a16="http://schemas.microsoft.com/office/drawing/2014/main" id="{10A23295-E85C-A85C-C4B5-6FAF710160EF}"/>
+              </a:ext>
+            </a:extLst>
+          </p:cNvPr>
+          <p:cNvSpPr txBox="1"/>
+          <p:nvPr/>
+        </p:nvSpPr>
+        <p:spPr>
+          <a:xfrm>
+            <a:off x="2935706" y="272718"/>
+            <a:ext cx="5957272" cy="461665"/>
+          </a:xfrm>
+          <a:prstGeom prst="rect">
+            <a:avLst/>
+          </a:prstGeom>
+          <a:noFill/>
+        </p:spPr>
+        <p:txBody>
+          <a:bodyPr wrap="none" rtlCol="0">
+            <a:spAutoFit/>
+          </a:bodyPr>
+          <a:lstStyle/>
+          <a:p>
+            <a:r>
+              <a:rPr lang="en-US" sz="2400" b="1" dirty="0"/>
+              <a:t>Data used for practical lab: </a:t>
+            </a:r>
+            <a:r>
+              <a:rPr lang="en-US" sz="2400" b="1" dirty="0" err="1"/>
+              <a:t>RNAseq</a:t>
+            </a:r>
+            <a:r>
+              <a:rPr lang="en-US" sz="2400" b="1" dirty="0"/>
+              <a:t> workflow</a:t>
+            </a:r>
+          </a:p>
+        </p:txBody>
+      </p:sp>
+      <p:sp>
+        <p:nvSpPr>
+          <p:cNvPr id="7" name="TextBox 6">
+            <a:extLst>
+              <a:ext uri="{FF2B5EF4-FFF2-40B4-BE49-F238E27FC236}">
+                <a16:creationId xmlns:a16="http://schemas.microsoft.com/office/drawing/2014/main" id="{DB0BF6B6-6F08-2473-577E-47B4A62C54D4}"/>
+              </a:ext>
+            </a:extLst>
+          </p:cNvPr>
+          <p:cNvSpPr txBox="1"/>
+          <p:nvPr/>
+        </p:nvSpPr>
+        <p:spPr>
+          <a:xfrm>
+            <a:off x="6684365" y="1307617"/>
+            <a:ext cx="689612" cy="369332"/>
+          </a:xfrm>
+          <a:prstGeom prst="rect">
+            <a:avLst/>
+          </a:prstGeom>
+          <a:noFill/>
+        </p:spPr>
+        <p:txBody>
+          <a:bodyPr wrap="none" rtlCol="0">
+            <a:spAutoFit/>
+          </a:bodyPr>
+          <a:lstStyle/>
+          <a:p>
+            <a:r>
+              <a:rPr lang="en-US" b="1" dirty="0"/>
+              <a:t>Basal</a:t>
+            </a:r>
+          </a:p>
+        </p:txBody>
+      </p:sp>
+      <p:sp>
+        <p:nvSpPr>
+          <p:cNvPr id="12" name="TextBox 11">
+            <a:extLst>
+              <a:ext uri="{FF2B5EF4-FFF2-40B4-BE49-F238E27FC236}">
+                <a16:creationId xmlns:a16="http://schemas.microsoft.com/office/drawing/2014/main" id="{B033BDFA-D6A3-D9F2-FE7B-6293DF3166CE}"/>
+              </a:ext>
+            </a:extLst>
+          </p:cNvPr>
+          <p:cNvSpPr txBox="1"/>
+          <p:nvPr/>
+        </p:nvSpPr>
+        <p:spPr>
+          <a:xfrm>
+            <a:off x="7927628" y="1307617"/>
+            <a:ext cx="980012" cy="369332"/>
+          </a:xfrm>
+          <a:prstGeom prst="rect">
+            <a:avLst/>
+          </a:prstGeom>
+          <a:noFill/>
+        </p:spPr>
+        <p:txBody>
+          <a:bodyPr wrap="none" rtlCol="0">
+            <a:spAutoFit/>
+          </a:bodyPr>
+          <a:lstStyle/>
+          <a:p>
+            <a:r>
+              <a:rPr lang="en-US" b="1" dirty="0"/>
+              <a:t>Classical</a:t>
+            </a:r>
+          </a:p>
+        </p:txBody>
+      </p:sp>
+      <p:sp>
+        <p:nvSpPr>
+          <p:cNvPr id="13" name="TextBox 12">
+            <a:extLst>
+              <a:ext uri="{FF2B5EF4-FFF2-40B4-BE49-F238E27FC236}">
+                <a16:creationId xmlns:a16="http://schemas.microsoft.com/office/drawing/2014/main" id="{FDDD694A-E9F9-CA27-587A-C6C748960238}"/>
+              </a:ext>
+            </a:extLst>
+          </p:cNvPr>
+          <p:cNvSpPr txBox="1"/>
+          <p:nvPr/>
+        </p:nvSpPr>
+        <p:spPr>
+          <a:xfrm>
+            <a:off x="7510534" y="1379807"/>
+            <a:ext cx="384336" cy="369332"/>
+          </a:xfrm>
+          <a:prstGeom prst="rect">
+            <a:avLst/>
+          </a:prstGeom>
+          <a:noFill/>
+        </p:spPr>
+        <p:txBody>
+          <a:bodyPr wrap="none" rtlCol="0">
+            <a:spAutoFit/>
+          </a:bodyPr>
+          <a:lstStyle/>
+          <a:p>
+            <a:r>
+              <a:rPr lang="en-US" b="1" dirty="0"/>
+              <a:t>vs</a:t>
+            </a:r>
+          </a:p>
+        </p:txBody>
+      </p:sp>
+      <p:sp>
+        <p:nvSpPr>
+          <p:cNvPr id="14" name="TextBox 13">
+            <a:extLst>
+              <a:ext uri="{FF2B5EF4-FFF2-40B4-BE49-F238E27FC236}">
+                <a16:creationId xmlns:a16="http://schemas.microsoft.com/office/drawing/2014/main" id="{CF27F490-D95B-D3C1-EF5D-905984248405}"/>
+              </a:ext>
+            </a:extLst>
+          </p:cNvPr>
+          <p:cNvSpPr txBox="1"/>
+          <p:nvPr/>
+        </p:nvSpPr>
+        <p:spPr>
+          <a:xfrm>
+            <a:off x="7152288" y="2167647"/>
+            <a:ext cx="1267591" cy="646331"/>
+          </a:xfrm>
+          <a:prstGeom prst="rect">
+            <a:avLst/>
+          </a:prstGeom>
+          <a:noFill/>
+        </p:spPr>
+        <p:txBody>
+          <a:bodyPr wrap="none" rtlCol="0">
+            <a:spAutoFit/>
+          </a:bodyPr>
+          <a:lstStyle/>
+          <a:p>
+            <a:r>
+              <a:rPr lang="en-US" b="1" dirty="0"/>
+              <a:t>Differential</a:t>
+            </a:r>
+          </a:p>
+          <a:p>
+            <a:r>
+              <a:rPr lang="en-US" b="1" dirty="0"/>
+              <a:t>Expression</a:t>
+            </a:r>
+          </a:p>
+        </p:txBody>
+      </p:sp>
+      <p:sp>
+        <p:nvSpPr>
+          <p:cNvPr id="15" name="TextBox 14">
+            <a:extLst>
+              <a:ext uri="{FF2B5EF4-FFF2-40B4-BE49-F238E27FC236}">
+                <a16:creationId xmlns:a16="http://schemas.microsoft.com/office/drawing/2014/main" id="{BAEC2B4E-6E20-9A48-6384-FA891D0C1A3F}"/>
+              </a:ext>
+            </a:extLst>
+          </p:cNvPr>
+          <p:cNvSpPr txBox="1"/>
+          <p:nvPr/>
+        </p:nvSpPr>
+        <p:spPr>
+          <a:xfrm>
+            <a:off x="8417634" y="2306146"/>
+            <a:ext cx="919547" cy="369332"/>
+          </a:xfrm>
+          <a:prstGeom prst="rect">
+            <a:avLst/>
+          </a:prstGeom>
+          <a:noFill/>
+        </p:spPr>
+        <p:txBody>
+          <a:bodyPr wrap="none" rtlCol="0">
+            <a:spAutoFit/>
+          </a:bodyPr>
+          <a:lstStyle/>
+          <a:p>
+            <a:r>
+              <a:rPr lang="en-US" b="1" dirty="0"/>
+              <a:t>(</a:t>
+            </a:r>
+            <a:r>
+              <a:rPr lang="en-US" b="1" dirty="0" err="1"/>
+              <a:t>edgeR</a:t>
+            </a:r>
+            <a:r>
+              <a:rPr lang="en-US" b="1" dirty="0"/>
+              <a:t>)</a:t>
+            </a:r>
+          </a:p>
+        </p:txBody>
+      </p:sp>
+      <p:sp>
+        <p:nvSpPr>
+          <p:cNvPr id="16" name="TextBox 15">
+            <a:extLst>
+              <a:ext uri="{FF2B5EF4-FFF2-40B4-BE49-F238E27FC236}">
+                <a16:creationId xmlns:a16="http://schemas.microsoft.com/office/drawing/2014/main" id="{AAD3E827-1AE4-A0A3-6E60-C4DF71A9827B}"/>
+              </a:ext>
+            </a:extLst>
+          </p:cNvPr>
+          <p:cNvSpPr txBox="1"/>
+          <p:nvPr/>
+        </p:nvSpPr>
+        <p:spPr>
+          <a:xfrm>
+            <a:off x="8877407" y="3537832"/>
+            <a:ext cx="1694438" cy="923330"/>
+          </a:xfrm>
+          <a:prstGeom prst="rect">
+            <a:avLst/>
+          </a:prstGeom>
+          <a:noFill/>
+        </p:spPr>
+        <p:txBody>
+          <a:bodyPr wrap="none" rtlCol="0">
+            <a:spAutoFit/>
+          </a:bodyPr>
+          <a:lstStyle/>
+          <a:p>
+            <a:r>
+              <a:rPr lang="en-US" b="1" dirty="0"/>
+              <a:t>Gene list </a:t>
+            </a:r>
+          </a:p>
+          <a:p>
+            <a:r>
+              <a:rPr lang="en-US" b="1" dirty="0"/>
+              <a:t>extracted using </a:t>
+            </a:r>
+          </a:p>
+          <a:p>
+            <a:r>
+              <a:rPr lang="en-US" b="1" dirty="0"/>
+              <a:t>FDR cut-off</a:t>
+            </a:r>
+          </a:p>
+        </p:txBody>
+      </p:sp>
+      <p:sp>
+        <p:nvSpPr>
+          <p:cNvPr id="17" name="TextBox 16">
+            <a:extLst>
+              <a:ext uri="{FF2B5EF4-FFF2-40B4-BE49-F238E27FC236}">
+                <a16:creationId xmlns:a16="http://schemas.microsoft.com/office/drawing/2014/main" id="{CE16011F-2115-1317-8EC6-BA46FB9A5C3D}"/>
+              </a:ext>
+            </a:extLst>
+          </p:cNvPr>
+          <p:cNvSpPr txBox="1"/>
+          <p:nvPr/>
+        </p:nvSpPr>
+        <p:spPr>
+          <a:xfrm>
+            <a:off x="6708116" y="3537832"/>
+            <a:ext cx="1016625" cy="369332"/>
+          </a:xfrm>
+          <a:prstGeom prst="rect">
+            <a:avLst/>
+          </a:prstGeom>
+          <a:noFill/>
+        </p:spPr>
+        <p:txBody>
+          <a:bodyPr wrap="none" rtlCol="0">
+            <a:spAutoFit/>
+          </a:bodyPr>
+          <a:lstStyle/>
+          <a:p>
+            <a:r>
+              <a:rPr lang="en-US" b="1" dirty="0"/>
+              <a:t>Rank file</a:t>
+            </a:r>
+          </a:p>
+        </p:txBody>
+      </p:sp>
+      <p:pic>
+        <p:nvPicPr>
+          <p:cNvPr id="33" name="Picture 32">
+            <a:extLst>
+              <a:ext uri="{FF2B5EF4-FFF2-40B4-BE49-F238E27FC236}">
+                <a16:creationId xmlns:a16="http://schemas.microsoft.com/office/drawing/2014/main" id="{820E7E0F-3C05-8BE4-FAAC-C3CDC22EE6D1}"/>
+              </a:ext>
+            </a:extLst>
+          </p:cNvPr>
+          <p:cNvPicPr>
+            <a:picLocks noChangeAspect="1"/>
+          </p:cNvPicPr>
+          <p:nvPr/>
+        </p:nvPicPr>
+        <p:blipFill>
+          <a:blip r:embed="rId2"/>
+          <a:stretch>
+            <a:fillRect/>
+          </a:stretch>
+        </p:blipFill>
+        <p:spPr>
+          <a:xfrm>
+            <a:off x="1568802" y="1749139"/>
+            <a:ext cx="3739052" cy="3661155"/>
+          </a:xfrm>
+          <a:prstGeom prst="rect">
+            <a:avLst/>
+          </a:prstGeom>
+        </p:spPr>
+      </p:pic>
+      <p:pic>
+        <p:nvPicPr>
+          <p:cNvPr id="37" name="Picture 36">
+            <a:extLst>
+              <a:ext uri="{FF2B5EF4-FFF2-40B4-BE49-F238E27FC236}">
+                <a16:creationId xmlns:a16="http://schemas.microsoft.com/office/drawing/2014/main" id="{F38A2869-6901-4C86-C5EA-B71461CDA86F}"/>
+              </a:ext>
+            </a:extLst>
+          </p:cNvPr>
+          <p:cNvPicPr>
+            <a:picLocks noChangeAspect="1"/>
+          </p:cNvPicPr>
+          <p:nvPr/>
+        </p:nvPicPr>
+        <p:blipFill>
+          <a:blip r:embed="rId3"/>
+          <a:stretch>
+            <a:fillRect/>
+          </a:stretch>
+        </p:blipFill>
+        <p:spPr>
+          <a:xfrm>
+            <a:off x="0" y="4547813"/>
+            <a:ext cx="1604816" cy="886872"/>
+          </a:xfrm>
+          <a:prstGeom prst="rect">
+            <a:avLst/>
+          </a:prstGeom>
+        </p:spPr>
+      </p:pic>
+      <p:pic>
+        <p:nvPicPr>
+          <p:cNvPr id="39" name="Picture 38">
+            <a:extLst>
+              <a:ext uri="{FF2B5EF4-FFF2-40B4-BE49-F238E27FC236}">
+                <a16:creationId xmlns:a16="http://schemas.microsoft.com/office/drawing/2014/main" id="{BB7AFC14-4F7C-1864-3014-02DE6194D3AC}"/>
+              </a:ext>
+            </a:extLst>
+          </p:cNvPr>
+          <p:cNvPicPr>
+            <a:picLocks noChangeAspect="1"/>
+          </p:cNvPicPr>
+          <p:nvPr/>
+        </p:nvPicPr>
+        <p:blipFill>
+          <a:blip r:embed="rId4"/>
+          <a:stretch>
+            <a:fillRect/>
+          </a:stretch>
+        </p:blipFill>
+        <p:spPr>
+          <a:xfrm>
+            <a:off x="533505" y="2956433"/>
+            <a:ext cx="663210" cy="1643607"/>
+          </a:xfrm>
+          <a:prstGeom prst="rect">
+            <a:avLst/>
+          </a:prstGeom>
+        </p:spPr>
+      </p:pic>
+      <p:sp>
+        <p:nvSpPr>
+          <p:cNvPr id="40" name="TextBox 39">
+            <a:extLst>
+              <a:ext uri="{FF2B5EF4-FFF2-40B4-BE49-F238E27FC236}">
+                <a16:creationId xmlns:a16="http://schemas.microsoft.com/office/drawing/2014/main" id="{A3B3FA9C-43F2-36FC-7778-34FC82E36248}"/>
+              </a:ext>
+            </a:extLst>
+          </p:cNvPr>
+          <p:cNvSpPr txBox="1"/>
+          <p:nvPr/>
+        </p:nvSpPr>
+        <p:spPr>
+          <a:xfrm>
+            <a:off x="393798" y="5691249"/>
+            <a:ext cx="5702202" cy="430887"/>
+          </a:xfrm>
+          <a:prstGeom prst="rect">
+            <a:avLst/>
+          </a:prstGeom>
+          <a:noFill/>
+        </p:spPr>
+        <p:txBody>
+          <a:bodyPr wrap="none" rtlCol="0">
+            <a:spAutoFit/>
+          </a:bodyPr>
+          <a:lstStyle/>
+          <a:p>
+            <a:r>
+              <a:rPr lang="en-CA" sz="1100" b="0" i="0" dirty="0">
+                <a:solidFill>
+                  <a:srgbClr val="222222"/>
+                </a:solidFill>
+                <a:effectLst/>
+                <a:latin typeface="-apple-system"/>
+              </a:rPr>
+              <a:t>Moffitt, R., </a:t>
+            </a:r>
+            <a:r>
+              <a:rPr lang="en-CA" sz="1100" b="0" i="0" dirty="0" err="1">
+                <a:solidFill>
+                  <a:srgbClr val="222222"/>
+                </a:solidFill>
+                <a:effectLst/>
+                <a:latin typeface="-apple-system"/>
+              </a:rPr>
+              <a:t>Marayati</a:t>
+            </a:r>
+            <a:r>
+              <a:rPr lang="en-CA" sz="1100" b="0" i="0" dirty="0">
+                <a:solidFill>
+                  <a:srgbClr val="222222"/>
+                </a:solidFill>
+                <a:effectLst/>
+                <a:latin typeface="-apple-system"/>
+              </a:rPr>
+              <a:t>, R., </a:t>
+            </a:r>
+            <a:r>
+              <a:rPr lang="en-CA" sz="1100" b="0" i="0" dirty="0" err="1">
+                <a:solidFill>
+                  <a:srgbClr val="222222"/>
+                </a:solidFill>
+                <a:effectLst/>
+                <a:latin typeface="-apple-system"/>
+              </a:rPr>
+              <a:t>Flate</a:t>
+            </a:r>
+            <a:r>
+              <a:rPr lang="en-CA" sz="1100" b="0" i="0" dirty="0">
+                <a:solidFill>
+                  <a:srgbClr val="222222"/>
+                </a:solidFill>
+                <a:effectLst/>
+                <a:latin typeface="-apple-system"/>
+              </a:rPr>
+              <a:t>, E. </a:t>
+            </a:r>
+            <a:r>
+              <a:rPr lang="en-CA" sz="1100" b="0" i="1" dirty="0">
+                <a:solidFill>
+                  <a:srgbClr val="222222"/>
+                </a:solidFill>
+                <a:effectLst/>
+                <a:latin typeface="-apple-system"/>
+              </a:rPr>
+              <a:t>et al.</a:t>
+            </a:r>
+            <a:r>
+              <a:rPr lang="en-CA" sz="1100" b="0" i="0" dirty="0">
+                <a:solidFill>
+                  <a:srgbClr val="222222"/>
+                </a:solidFill>
+                <a:effectLst/>
+                <a:latin typeface="-apple-system"/>
+              </a:rPr>
+              <a:t> Virtual microdissection identifies distinct tumor- and </a:t>
+            </a:r>
+          </a:p>
+          <a:p>
+            <a:r>
+              <a:rPr lang="en-CA" sz="1100" b="0" i="0" dirty="0">
+                <a:solidFill>
+                  <a:srgbClr val="222222"/>
+                </a:solidFill>
+                <a:effectLst/>
+                <a:latin typeface="-apple-system"/>
+              </a:rPr>
+              <a:t>stroma-specific subtypes of pancreatic ductal adenocarcinoma. </a:t>
+            </a:r>
+            <a:r>
+              <a:rPr lang="en-CA" sz="1100" b="0" i="1" dirty="0">
+                <a:solidFill>
+                  <a:srgbClr val="222222"/>
+                </a:solidFill>
+                <a:effectLst/>
+                <a:latin typeface="-apple-system"/>
+              </a:rPr>
+              <a:t>Nat Genet</a:t>
+            </a:r>
+            <a:r>
+              <a:rPr lang="en-CA" sz="1100" b="0" i="0" dirty="0">
+                <a:solidFill>
+                  <a:srgbClr val="222222"/>
+                </a:solidFill>
+                <a:effectLst/>
+                <a:latin typeface="-apple-system"/>
+              </a:rPr>
+              <a:t> </a:t>
+            </a:r>
+            <a:r>
+              <a:rPr lang="en-CA" sz="1100" b="1" i="0" dirty="0">
+                <a:solidFill>
+                  <a:srgbClr val="222222"/>
+                </a:solidFill>
+                <a:effectLst/>
+                <a:latin typeface="-apple-system"/>
+              </a:rPr>
+              <a:t>47</a:t>
+            </a:r>
+            <a:r>
+              <a:rPr lang="en-CA" sz="1100" b="0" i="0" dirty="0">
+                <a:solidFill>
+                  <a:srgbClr val="222222"/>
+                </a:solidFill>
+                <a:effectLst/>
+                <a:latin typeface="-apple-system"/>
+              </a:rPr>
+              <a:t>, 1168–1178 (2015)</a:t>
+            </a:r>
+            <a:endParaRPr lang="en-US" sz="1100" dirty="0"/>
+          </a:p>
+        </p:txBody>
+      </p:sp>
+      <p:cxnSp>
+        <p:nvCxnSpPr>
+          <p:cNvPr id="42" name="Straight Arrow Connector 41">
+            <a:extLst>
+              <a:ext uri="{FF2B5EF4-FFF2-40B4-BE49-F238E27FC236}">
+                <a16:creationId xmlns:a16="http://schemas.microsoft.com/office/drawing/2014/main" id="{23BCCE69-C964-AF66-90E2-9747449AA323}"/>
+              </a:ext>
+            </a:extLst>
+          </p:cNvPr>
+          <p:cNvCxnSpPr>
+            <a:cxnSpLocks/>
+          </p:cNvCxnSpPr>
+          <p:nvPr/>
+        </p:nvCxnSpPr>
+        <p:spPr>
+          <a:xfrm>
+            <a:off x="3856183" y="1492283"/>
+            <a:ext cx="2604337" cy="0"/>
+          </a:xfrm>
+          <a:prstGeom prst="straightConnector1">
+            <a:avLst/>
+          </a:prstGeom>
+          <a:ln w="57150">
+            <a:tailEnd type="triangle"/>
+          </a:ln>
+        </p:spPr>
+        <p:style>
+          <a:lnRef idx="1">
+            <a:schemeClr val="dk1"/>
+          </a:lnRef>
+          <a:fillRef idx="0">
+            <a:schemeClr val="dk1"/>
+          </a:fillRef>
+          <a:effectRef idx="0">
+            <a:schemeClr val="dk1"/>
+          </a:effectRef>
+          <a:fontRef idx="minor">
+            <a:schemeClr val="tx1"/>
+          </a:fontRef>
+        </p:style>
+      </p:cxnSp>
+      <p:cxnSp>
+        <p:nvCxnSpPr>
+          <p:cNvPr id="45" name="Straight Arrow Connector 44">
+            <a:extLst>
+              <a:ext uri="{FF2B5EF4-FFF2-40B4-BE49-F238E27FC236}">
+                <a16:creationId xmlns:a16="http://schemas.microsoft.com/office/drawing/2014/main" id="{94026130-FDCC-1130-5086-EB55C2ED2AFC}"/>
+              </a:ext>
+            </a:extLst>
+          </p:cNvPr>
+          <p:cNvCxnSpPr>
+            <a:stCxn id="13" idx="2"/>
+          </p:cNvCxnSpPr>
+          <p:nvPr/>
+        </p:nvCxnSpPr>
+        <p:spPr>
+          <a:xfrm>
+            <a:off x="7702702" y="1749139"/>
+            <a:ext cx="0" cy="418508"/>
+          </a:xfrm>
+          <a:prstGeom prst="straightConnector1">
+            <a:avLst/>
+          </a:prstGeom>
+          <a:ln w="57150">
+            <a:solidFill>
+              <a:schemeClr val="tx1"/>
+            </a:solidFill>
+            <a:tailEnd type="triangle"/>
+          </a:ln>
+        </p:spPr>
+        <p:style>
+          <a:lnRef idx="1">
+            <a:schemeClr val="accent1"/>
+          </a:lnRef>
+          <a:fillRef idx="0">
+            <a:schemeClr val="accent1"/>
+          </a:fillRef>
+          <a:effectRef idx="0">
+            <a:schemeClr val="accent1"/>
+          </a:effectRef>
+          <a:fontRef idx="minor">
+            <a:schemeClr val="tx1"/>
+          </a:fontRef>
+        </p:style>
+      </p:cxnSp>
+      <p:cxnSp>
+        <p:nvCxnSpPr>
+          <p:cNvPr id="46" name="Straight Arrow Connector 45">
+            <a:extLst>
+              <a:ext uri="{FF2B5EF4-FFF2-40B4-BE49-F238E27FC236}">
+                <a16:creationId xmlns:a16="http://schemas.microsoft.com/office/drawing/2014/main" id="{22562E2A-91EA-BB98-F56C-35981AE10D81}"/>
+              </a:ext>
+            </a:extLst>
+          </p:cNvPr>
+          <p:cNvCxnSpPr>
+            <a:cxnSpLocks/>
+            <a:endCxn id="17" idx="0"/>
+          </p:cNvCxnSpPr>
+          <p:nvPr/>
+        </p:nvCxnSpPr>
+        <p:spPr>
+          <a:xfrm flipH="1">
+            <a:off x="7216429" y="2813978"/>
+            <a:ext cx="294105" cy="723854"/>
+          </a:xfrm>
+          <a:prstGeom prst="straightConnector1">
+            <a:avLst/>
+          </a:prstGeom>
+          <a:ln w="57150">
+            <a:solidFill>
+              <a:schemeClr val="tx1"/>
+            </a:solidFill>
+            <a:tailEnd type="triangle"/>
+          </a:ln>
+        </p:spPr>
+        <p:style>
+          <a:lnRef idx="1">
+            <a:schemeClr val="accent1"/>
+          </a:lnRef>
+          <a:fillRef idx="0">
+            <a:schemeClr val="accent1"/>
+          </a:fillRef>
+          <a:effectRef idx="0">
+            <a:schemeClr val="accent1"/>
+          </a:effectRef>
+          <a:fontRef idx="minor">
+            <a:schemeClr val="tx1"/>
+          </a:fontRef>
+        </p:style>
+      </p:cxnSp>
+      <p:cxnSp>
+        <p:nvCxnSpPr>
+          <p:cNvPr id="48" name="Straight Arrow Connector 47">
+            <a:extLst>
+              <a:ext uri="{FF2B5EF4-FFF2-40B4-BE49-F238E27FC236}">
+                <a16:creationId xmlns:a16="http://schemas.microsoft.com/office/drawing/2014/main" id="{65DF3DDB-90A6-7254-84F6-9AF6850D6B68}"/>
+              </a:ext>
+            </a:extLst>
+          </p:cNvPr>
+          <p:cNvCxnSpPr>
+            <a:cxnSpLocks/>
+          </p:cNvCxnSpPr>
+          <p:nvPr/>
+        </p:nvCxnSpPr>
+        <p:spPr>
+          <a:xfrm>
+            <a:off x="7697172" y="2813978"/>
+            <a:ext cx="1640009" cy="723854"/>
+          </a:xfrm>
+          <a:prstGeom prst="straightConnector1">
+            <a:avLst/>
+          </a:prstGeom>
+          <a:ln w="57150">
+            <a:solidFill>
+              <a:schemeClr val="tx1"/>
+            </a:solidFill>
+            <a:tailEnd type="triangle"/>
+          </a:ln>
+        </p:spPr>
+        <p:style>
+          <a:lnRef idx="1">
+            <a:schemeClr val="accent1"/>
+          </a:lnRef>
+          <a:fillRef idx="0">
+            <a:schemeClr val="accent1"/>
+          </a:fillRef>
+          <a:effectRef idx="0">
+            <a:schemeClr val="accent1"/>
+          </a:effectRef>
+          <a:fontRef idx="minor">
+            <a:schemeClr val="tx1"/>
+          </a:fontRef>
+        </p:style>
+      </p:cxnSp>
+      <p:cxnSp>
+        <p:nvCxnSpPr>
+          <p:cNvPr id="50" name="Straight Arrow Connector 49">
+            <a:extLst>
+              <a:ext uri="{FF2B5EF4-FFF2-40B4-BE49-F238E27FC236}">
+                <a16:creationId xmlns:a16="http://schemas.microsoft.com/office/drawing/2014/main" id="{A9AF7E13-18F3-65B2-11AB-3E9F8ADAA552}"/>
+              </a:ext>
+            </a:extLst>
+          </p:cNvPr>
+          <p:cNvCxnSpPr>
+            <a:cxnSpLocks/>
+          </p:cNvCxnSpPr>
+          <p:nvPr/>
+        </p:nvCxnSpPr>
+        <p:spPr>
+          <a:xfrm>
+            <a:off x="7160294" y="3994528"/>
+            <a:ext cx="0" cy="418508"/>
+          </a:xfrm>
+          <a:prstGeom prst="straightConnector1">
+            <a:avLst/>
+          </a:prstGeom>
+          <a:ln w="57150">
+            <a:solidFill>
+              <a:schemeClr val="tx1"/>
+            </a:solidFill>
+            <a:tailEnd type="triangle"/>
+          </a:ln>
+        </p:spPr>
+        <p:style>
+          <a:lnRef idx="1">
+            <a:schemeClr val="accent1"/>
+          </a:lnRef>
+          <a:fillRef idx="0">
+            <a:schemeClr val="accent1"/>
+          </a:fillRef>
+          <a:effectRef idx="0">
+            <a:schemeClr val="accent1"/>
+          </a:effectRef>
+          <a:fontRef idx="minor">
+            <a:schemeClr val="tx1"/>
+          </a:fontRef>
+        </p:style>
+      </p:cxnSp>
+      <p:cxnSp>
+        <p:nvCxnSpPr>
+          <p:cNvPr id="51" name="Straight Arrow Connector 50">
+            <a:extLst>
+              <a:ext uri="{FF2B5EF4-FFF2-40B4-BE49-F238E27FC236}">
+                <a16:creationId xmlns:a16="http://schemas.microsoft.com/office/drawing/2014/main" id="{6F5FCB8C-4448-4E94-4D8D-037F82EF6F52}"/>
+              </a:ext>
+            </a:extLst>
+          </p:cNvPr>
+          <p:cNvCxnSpPr/>
+          <p:nvPr/>
+        </p:nvCxnSpPr>
+        <p:spPr>
+          <a:xfrm>
+            <a:off x="9703054" y="4438750"/>
+            <a:ext cx="0" cy="418508"/>
+          </a:xfrm>
+          <a:prstGeom prst="straightConnector1">
+            <a:avLst/>
+          </a:prstGeom>
+          <a:ln w="57150">
+            <a:solidFill>
+              <a:schemeClr val="tx1"/>
+            </a:solidFill>
+            <a:tailEnd type="triangle"/>
+          </a:ln>
+        </p:spPr>
+        <p:style>
+          <a:lnRef idx="1">
+            <a:schemeClr val="accent1"/>
+          </a:lnRef>
+          <a:fillRef idx="0">
+            <a:schemeClr val="accent1"/>
+          </a:fillRef>
+          <a:effectRef idx="0">
+            <a:schemeClr val="accent1"/>
+          </a:effectRef>
+          <a:fontRef idx="minor">
+            <a:schemeClr val="tx1"/>
+          </a:fontRef>
+        </p:style>
+      </p:cxnSp>
+      <p:cxnSp>
+        <p:nvCxnSpPr>
+          <p:cNvPr id="52" name="Straight Arrow Connector 51">
+            <a:extLst>
+              <a:ext uri="{FF2B5EF4-FFF2-40B4-BE49-F238E27FC236}">
+                <a16:creationId xmlns:a16="http://schemas.microsoft.com/office/drawing/2014/main" id="{2732A50C-684E-AB41-C997-BCDFF5C0EB73}"/>
+              </a:ext>
+            </a:extLst>
+          </p:cNvPr>
+          <p:cNvCxnSpPr>
+            <a:cxnSpLocks/>
+          </p:cNvCxnSpPr>
+          <p:nvPr/>
+        </p:nvCxnSpPr>
+        <p:spPr>
+          <a:xfrm>
+            <a:off x="7160294" y="5481995"/>
+            <a:ext cx="0" cy="418508"/>
+          </a:xfrm>
+          <a:prstGeom prst="straightConnector1">
+            <a:avLst/>
+          </a:prstGeom>
+          <a:ln w="57150">
+            <a:solidFill>
+              <a:schemeClr val="tx1"/>
+            </a:solidFill>
+            <a:tailEnd type="triangle"/>
+          </a:ln>
+        </p:spPr>
+        <p:style>
+          <a:lnRef idx="1">
+            <a:schemeClr val="accent1"/>
+          </a:lnRef>
+          <a:fillRef idx="0">
+            <a:schemeClr val="accent1"/>
+          </a:fillRef>
+          <a:effectRef idx="0">
+            <a:schemeClr val="accent1"/>
+          </a:effectRef>
+          <a:fontRef idx="minor">
+            <a:schemeClr val="tx1"/>
+          </a:fontRef>
+        </p:style>
+      </p:cxnSp>
+      <p:cxnSp>
+        <p:nvCxnSpPr>
+          <p:cNvPr id="53" name="Straight Arrow Connector 52">
+            <a:extLst>
+              <a:ext uri="{FF2B5EF4-FFF2-40B4-BE49-F238E27FC236}">
+                <a16:creationId xmlns:a16="http://schemas.microsoft.com/office/drawing/2014/main" id="{301AAA94-B60C-9442-7AC5-970F69B9807E}"/>
+              </a:ext>
+            </a:extLst>
+          </p:cNvPr>
+          <p:cNvCxnSpPr/>
+          <p:nvPr/>
+        </p:nvCxnSpPr>
+        <p:spPr>
+          <a:xfrm>
+            <a:off x="9732029" y="5434685"/>
+            <a:ext cx="0" cy="418508"/>
+          </a:xfrm>
+          <a:prstGeom prst="straightConnector1">
+            <a:avLst/>
+          </a:prstGeom>
+          <a:ln w="57150">
+            <a:solidFill>
+              <a:schemeClr val="tx1"/>
+            </a:solidFill>
+            <a:tailEnd type="triangle"/>
+          </a:ln>
+        </p:spPr>
+        <p:style>
+          <a:lnRef idx="1">
+            <a:schemeClr val="accent1"/>
+          </a:lnRef>
+          <a:fillRef idx="0">
+            <a:schemeClr val="accent1"/>
+          </a:fillRef>
+          <a:effectRef idx="0">
+            <a:schemeClr val="accent1"/>
+          </a:effectRef>
+          <a:fontRef idx="minor">
+            <a:schemeClr val="tx1"/>
+          </a:fontRef>
+        </p:style>
+      </p:cxnSp>
+      <p:cxnSp>
+        <p:nvCxnSpPr>
+          <p:cNvPr id="55" name="Straight Connector 54">
+            <a:extLst>
+              <a:ext uri="{FF2B5EF4-FFF2-40B4-BE49-F238E27FC236}">
+                <a16:creationId xmlns:a16="http://schemas.microsoft.com/office/drawing/2014/main" id="{26EF88ED-4012-5B81-0ECB-7BD51F564D77}"/>
+              </a:ext>
+            </a:extLst>
+          </p:cNvPr>
+          <p:cNvCxnSpPr/>
+          <p:nvPr/>
+        </p:nvCxnSpPr>
+        <p:spPr>
+          <a:xfrm>
+            <a:off x="3850105" y="1476241"/>
+            <a:ext cx="0" cy="256856"/>
+          </a:xfrm>
+          <a:prstGeom prst="line">
+            <a:avLst/>
+          </a:prstGeom>
+          <a:ln w="57150">
+            <a:solidFill>
+              <a:schemeClr val="tx1"/>
+            </a:solidFill>
+          </a:ln>
+        </p:spPr>
+        <p:style>
+          <a:lnRef idx="1">
+            <a:schemeClr val="accent1"/>
+          </a:lnRef>
+          <a:fillRef idx="0">
+            <a:schemeClr val="accent1"/>
+          </a:fillRef>
+          <a:effectRef idx="0">
+            <a:schemeClr val="accent1"/>
+          </a:effectRef>
+          <a:fontRef idx="minor">
+            <a:schemeClr val="tx1"/>
+          </a:fontRef>
+        </p:style>
+      </p:cxnSp>
+      <p:pic>
+        <p:nvPicPr>
+          <p:cNvPr id="1030" name="Picture 6" descr="Welcome to Cytoscape 3">
+            <a:extLst>
+              <a:ext uri="{FF2B5EF4-FFF2-40B4-BE49-F238E27FC236}">
+                <a16:creationId xmlns:a16="http://schemas.microsoft.com/office/drawing/2014/main" id="{1F545082-252D-ED80-BC70-9D83FE8E2005}"/>
+              </a:ext>
+            </a:extLst>
+          </p:cNvPr>
+          <p:cNvPicPr>
+            <a:picLocks noChangeAspect="1" noChangeArrowheads="1"/>
+          </p:cNvPicPr>
+          <p:nvPr/>
+        </p:nvPicPr>
+        <p:blipFill>
+          <a:blip r:embed="rId5">
+            <a:extLst>
+              <a:ext uri="{28A0092B-C50C-407E-A947-70E740481C1C}">
+                <a14:useLocalDpi xmlns:a14="http://schemas.microsoft.com/office/drawing/2010/main" val="0"/>
+              </a:ext>
+            </a:extLst>
+          </a:blip>
+          <a:srcRect/>
+          <a:stretch>
+            <a:fillRect/>
+          </a:stretch>
+        </p:blipFill>
+        <p:spPr bwMode="auto">
+          <a:xfrm>
+            <a:off x="6063076" y="5853193"/>
+            <a:ext cx="718521" cy="718521"/>
+          </a:xfrm>
+          <a:prstGeom prst="rect">
+            <a:avLst/>
+          </a:prstGeom>
+          <a:noFill/>
+          <a:extLst>
+            <a:ext uri="{909E8E84-426E-40DD-AFC4-6F175D3DCCD1}">
+              <a14:hiddenFill xmlns:a14="http://schemas.microsoft.com/office/drawing/2010/main">
+                <a:solidFill>
+                  <a:srgbClr val="FFFFFF"/>
+                </a:solidFill>
+              </a14:hiddenFill>
+            </a:ext>
+          </a:extLst>
+        </p:spPr>
+      </p:pic>
+      <p:pic>
+        <p:nvPicPr>
+          <p:cNvPr id="56" name="Picture 6" descr="Welcome to Cytoscape 3">
+            <a:extLst>
+              <a:ext uri="{FF2B5EF4-FFF2-40B4-BE49-F238E27FC236}">
+                <a16:creationId xmlns:a16="http://schemas.microsoft.com/office/drawing/2014/main" id="{247917AD-AA01-FB60-E879-5FACBE83456E}"/>
+              </a:ext>
+            </a:extLst>
+          </p:cNvPr>
+          <p:cNvPicPr>
+            <a:picLocks noChangeAspect="1" noChangeArrowheads="1"/>
+          </p:cNvPicPr>
+          <p:nvPr/>
+        </p:nvPicPr>
+        <p:blipFill>
+          <a:blip r:embed="rId5">
+            <a:extLst>
+              <a:ext uri="{28A0092B-C50C-407E-A947-70E740481C1C}">
+                <a14:useLocalDpi xmlns:a14="http://schemas.microsoft.com/office/drawing/2010/main" val="0"/>
+              </a:ext>
+            </a:extLst>
+          </a:blip>
+          <a:srcRect/>
+          <a:stretch>
+            <a:fillRect/>
+          </a:stretch>
+        </p:blipFill>
+        <p:spPr bwMode="auto">
+          <a:xfrm>
+            <a:off x="8877407" y="5900503"/>
+            <a:ext cx="718521" cy="718521"/>
+          </a:xfrm>
+          <a:prstGeom prst="rect">
+            <a:avLst/>
+          </a:prstGeom>
+          <a:noFill/>
+          <a:extLst>
+            <a:ext uri="{909E8E84-426E-40DD-AFC4-6F175D3DCCD1}">
+              <a14:hiddenFill xmlns:a14="http://schemas.microsoft.com/office/drawing/2010/main">
+                <a:solidFill>
+                  <a:srgbClr val="FFFFFF"/>
+                </a:solidFill>
+              </a14:hiddenFill>
+            </a:ext>
+          </a:extLst>
+        </p:spPr>
+      </p:pic>
+      <p:pic>
+        <p:nvPicPr>
+          <p:cNvPr id="1032" name="Picture 8" descr="Quick Start — EnrichmentMap 3.4.0 ...">
+            <a:extLst>
+              <a:ext uri="{FF2B5EF4-FFF2-40B4-BE49-F238E27FC236}">
+                <a16:creationId xmlns:a16="http://schemas.microsoft.com/office/drawing/2014/main" id="{73608E03-5B4E-EDCB-11F5-3FFA619264A5}"/>
+              </a:ext>
+            </a:extLst>
+          </p:cNvPr>
+          <p:cNvPicPr>
+            <a:picLocks noChangeAspect="1" noChangeArrowheads="1"/>
+          </p:cNvPicPr>
+          <p:nvPr/>
+        </p:nvPicPr>
+        <p:blipFill>
+          <a:blip r:embed="rId6">
+            <a:extLst>
+              <a:ext uri="{28A0092B-C50C-407E-A947-70E740481C1C}">
+                <a14:useLocalDpi xmlns:a14="http://schemas.microsoft.com/office/drawing/2010/main" val="0"/>
+              </a:ext>
+            </a:extLst>
+          </a:blip>
+          <a:srcRect/>
+          <a:stretch>
+            <a:fillRect/>
+          </a:stretch>
+        </p:blipFill>
+        <p:spPr bwMode="auto">
+          <a:xfrm>
+            <a:off x="6898346" y="5940975"/>
+            <a:ext cx="1224376" cy="630739"/>
+          </a:xfrm>
+          <a:prstGeom prst="rect">
+            <a:avLst/>
+          </a:prstGeom>
+          <a:noFill/>
+          <a:extLst>
+            <a:ext uri="{909E8E84-426E-40DD-AFC4-6F175D3DCCD1}">
+              <a14:hiddenFill xmlns:a14="http://schemas.microsoft.com/office/drawing/2010/main">
+                <a:solidFill>
+                  <a:srgbClr val="FFFFFF"/>
+                </a:solidFill>
+              </a14:hiddenFill>
+            </a:ext>
+          </a:extLst>
+        </p:spPr>
+      </p:pic>
+      <p:pic>
+        <p:nvPicPr>
+          <p:cNvPr id="58" name="Picture 8" descr="Quick Start — EnrichmentMap 3.4.0 ...">
+            <a:extLst>
+              <a:ext uri="{FF2B5EF4-FFF2-40B4-BE49-F238E27FC236}">
+                <a16:creationId xmlns:a16="http://schemas.microsoft.com/office/drawing/2014/main" id="{A15E0BC2-F465-2D3F-C2F3-8B62B6DF674C}"/>
+              </a:ext>
+            </a:extLst>
+          </p:cNvPr>
+          <p:cNvPicPr>
+            <a:picLocks noChangeAspect="1" noChangeArrowheads="1"/>
+          </p:cNvPicPr>
+          <p:nvPr/>
+        </p:nvPicPr>
+        <p:blipFill>
+          <a:blip r:embed="rId6">
+            <a:extLst>
+              <a:ext uri="{28A0092B-C50C-407E-A947-70E740481C1C}">
+                <a14:useLocalDpi xmlns:a14="http://schemas.microsoft.com/office/drawing/2010/main" val="0"/>
+              </a:ext>
+            </a:extLst>
+          </a:blip>
+          <a:srcRect/>
+          <a:stretch>
+            <a:fillRect/>
+          </a:stretch>
+        </p:blipFill>
+        <p:spPr bwMode="auto">
+          <a:xfrm>
+            <a:off x="9606344" y="5929091"/>
+            <a:ext cx="1224376" cy="630739"/>
+          </a:xfrm>
+          <a:prstGeom prst="rect">
+            <a:avLst/>
+          </a:prstGeom>
+          <a:noFill/>
+          <a:extLst>
+            <a:ext uri="{909E8E84-426E-40DD-AFC4-6F175D3DCCD1}">
+              <a14:hiddenFill xmlns:a14="http://schemas.microsoft.com/office/drawing/2010/main">
+                <a:solidFill>
+                  <a:srgbClr val="FFFFFF"/>
+                </a:solidFill>
+              </a14:hiddenFill>
+            </a:ext>
+          </a:extLst>
+        </p:spPr>
+      </p:pic>
+      <p:pic>
+        <p:nvPicPr>
+          <p:cNvPr id="1034" name="Picture 10" descr="functional enrichment analysis ...">
+            <a:extLst>
+              <a:ext uri="{FF2B5EF4-FFF2-40B4-BE49-F238E27FC236}">
+                <a16:creationId xmlns:a16="http://schemas.microsoft.com/office/drawing/2014/main" id="{D69AD88E-F302-27B7-AC2D-10EF7FD45309}"/>
+              </a:ext>
+            </a:extLst>
+          </p:cNvPr>
+          <p:cNvPicPr>
+            <a:picLocks noChangeAspect="1" noChangeArrowheads="1"/>
+          </p:cNvPicPr>
+          <p:nvPr/>
+        </p:nvPicPr>
+        <p:blipFill>
+          <a:blip r:embed="rId7">
+            <a:extLst>
+              <a:ext uri="{28A0092B-C50C-407E-A947-70E740481C1C}">
+                <a14:useLocalDpi xmlns:a14="http://schemas.microsoft.com/office/drawing/2010/main" val="0"/>
+              </a:ext>
+            </a:extLst>
+          </a:blip>
+          <a:srcRect/>
+          <a:stretch>
+            <a:fillRect/>
+          </a:stretch>
+        </p:blipFill>
+        <p:spPr bwMode="auto">
+          <a:xfrm>
+            <a:off x="8907640" y="4883821"/>
+            <a:ext cx="1527136" cy="415523"/>
+          </a:xfrm>
+          <a:prstGeom prst="rect">
+            <a:avLst/>
+          </a:prstGeom>
+          <a:noFill/>
+          <a:extLst>
+            <a:ext uri="{909E8E84-426E-40DD-AFC4-6F175D3DCCD1}">
+              <a14:hiddenFill xmlns:a14="http://schemas.microsoft.com/office/drawing/2010/main">
+                <a:solidFill>
+                  <a:srgbClr val="FFFFFF"/>
+                </a:solidFill>
+              </a14:hiddenFill>
+            </a:ext>
+          </a:extLst>
+        </p:spPr>
+      </p:pic>
+      <p:pic>
+        <p:nvPicPr>
+          <p:cNvPr id="1036" name="Picture 12" descr="GSEA">
+            <a:extLst>
+              <a:ext uri="{FF2B5EF4-FFF2-40B4-BE49-F238E27FC236}">
+                <a16:creationId xmlns:a16="http://schemas.microsoft.com/office/drawing/2014/main" id="{3CC90BDA-9F63-737E-4C1A-50652EE336F5}"/>
+              </a:ext>
+            </a:extLst>
+          </p:cNvPr>
+          <p:cNvPicPr>
+            <a:picLocks noChangeAspect="1" noChangeArrowheads="1"/>
+          </p:cNvPicPr>
+          <p:nvPr/>
+        </p:nvPicPr>
+        <p:blipFill>
+          <a:blip r:embed="rId8">
+            <a:extLst>
+              <a:ext uri="{28A0092B-C50C-407E-A947-70E740481C1C}">
+                <a14:useLocalDpi xmlns:a14="http://schemas.microsoft.com/office/drawing/2010/main" val="0"/>
+              </a:ext>
+            </a:extLst>
+          </a:blip>
+          <a:srcRect/>
+          <a:stretch>
+            <a:fillRect/>
+          </a:stretch>
+        </p:blipFill>
+        <p:spPr bwMode="auto">
+          <a:xfrm>
+            <a:off x="6297206" y="4436579"/>
+            <a:ext cx="1838443" cy="970033"/>
+          </a:xfrm>
+          <a:prstGeom prst="rect">
+            <a:avLst/>
+          </a:prstGeom>
+          <a:noFill/>
+          <a:extLst>
+            <a:ext uri="{909E8E84-426E-40DD-AFC4-6F175D3DCCD1}">
+              <a14:hiddenFill xmlns:a14="http://schemas.microsoft.com/office/drawing/2010/main">
+                <a:solidFill>
+                  <a:srgbClr val="FFFFFF"/>
+                </a:solidFill>
+              </a14:hiddenFill>
+            </a:ext>
+          </a:extLst>
+        </p:spPr>
+      </p:pic>
+    </p:spTree>
+    <p:extLst>
+      <p:ext uri="{BB962C8B-B14F-4D97-AF65-F5344CB8AC3E}">
+        <p14:creationId xmlns:p14="http://schemas.microsoft.com/office/powerpoint/2010/main" val="841833699"/>
+      </p:ext>
+    </p:extLst>
+  </p:cSld>
+  <p:clrMapOvr>
+    <a:masterClrMapping/>
+  </p:clrMapOvr>
+</p:sld>
+</file>
+
+<file path=ppt/slides/slide7.xml><?xml version="1.0" encoding="utf-8"?>
+<p:sld xmlns:a="http://schemas.openxmlformats.org/drawingml/2006/main" xmlns:r="http://schemas.openxmlformats.org/officeDocument/2006/relationships" xmlns:p="http://schemas.openxmlformats.org/presentationml/2006/main">
+  <p:cSld>
+    <p:spTree>
+      <p:nvGrpSpPr>
+        <p:cNvPr id="1" name=""/>
+        <p:cNvGrpSpPr/>
+        <p:nvPr/>
+      </p:nvGrpSpPr>
+      <p:grpSpPr>
+        <a:xfrm>
+          <a:off x="0" y="0"/>
+          <a:ext cx="0" cy="0"/>
+          <a:chOff x="0" y="0"/>
+          <a:chExt cx="0" cy="0"/>
+        </a:xfrm>
+      </p:grpSpPr>
+      <p:sp>
+        <p:nvSpPr>
+          <p:cNvPr id="2" name="Title 1">
+            <a:extLst>
+              <a:ext uri="{FF2B5EF4-FFF2-40B4-BE49-F238E27FC236}">
+                <a16:creationId xmlns:a16="http://schemas.microsoft.com/office/drawing/2014/main" id="{C690CDE6-1383-4647-DA8E-FEBD92906A04}"/>
+              </a:ext>
+            </a:extLst>
+          </p:cNvPr>
+          <p:cNvSpPr>
+            <a:spLocks noGrp="1"/>
+          </p:cNvSpPr>
+          <p:nvPr>
+            <p:ph type="title"/>
+          </p:nvPr>
+        </p:nvSpPr>
+        <p:spPr/>
+        <p:txBody>
+          <a:bodyPr/>
+          <a:lstStyle/>
+          <a:p>
+            <a:endParaRPr lang="en-US"/>
+          </a:p>
+        </p:txBody>
+      </p:sp>
+      <p:sp>
+        <p:nvSpPr>
+          <p:cNvPr id="3" name="Content Placeholder 2">
+            <a:extLst>
+              <a:ext uri="{FF2B5EF4-FFF2-40B4-BE49-F238E27FC236}">
+                <a16:creationId xmlns:a16="http://schemas.microsoft.com/office/drawing/2014/main" id="{733746D1-05F6-F8B6-5316-F2C92EED38BF}"/>
+              </a:ext>
+            </a:extLst>
+          </p:cNvPr>
+          <p:cNvSpPr>
+            <a:spLocks noGrp="1"/>
+          </p:cNvSpPr>
+          <p:nvPr>
+            <p:ph idx="1"/>
+          </p:nvPr>
+        </p:nvSpPr>
+        <p:spPr/>
+        <p:txBody>
+          <a:bodyPr/>
+          <a:lstStyle/>
+          <a:p>
+            <a:endParaRPr lang="en-US"/>
+          </a:p>
+        </p:txBody>
+      </p:sp>
+    </p:spTree>
+    <p:extLst>
+      <p:ext uri="{BB962C8B-B14F-4D97-AF65-F5344CB8AC3E}">
+        <p14:creationId xmlns:p14="http://schemas.microsoft.com/office/powerpoint/2010/main" val="3148483898"/>
+      </p:ext>
+    </p:extLst>
+  </p:cSld>
+  <p:clrMapOvr>
+    <a:masterClrMapping/>
+  </p:clrMapOvr>
+</p:sld>
+</file>
+
 <file path=ppt/theme/theme1.xml><?xml version="1.0" encoding="utf-8"?>
 <a:theme xmlns:a="http://schemas.openxmlformats.org/drawingml/2006/main" name="Office Theme">
   <a:themeElements>

</xml_diff>